<commit_message>
updates notebook and file structure
</commit_message>
<xml_diff>
--- a/Domestic Violence During COVID-19 Pandemic Final.pptx
+++ b/Domestic Violence During COVID-19 Pandemic Final.pptx
@@ -137,13 +137,37 @@
 <file path=ppt/revisionInfo.xml><?xml version="1.0" encoding="utf-8"?>
 <p1510:revInfo xmlns:a="http://schemas.openxmlformats.org/drawingml/2006/main" xmlns:r="http://schemas.openxmlformats.org/officeDocument/2006/relationships" xmlns:p1510="http://schemas.microsoft.com/office/powerpoint/2015/10/main">
   <p1510:revLst>
-    <p1510:client id="{A5F2D892-D0FB-4B28-ACDD-81D8B73393DF}" v="3" dt="2021-12-08T02:10:51.491"/>
+    <p1510:client id="{1586950C-A568-9540-9DEE-7E3D61C6DAEC}" v="1" dt="2021-12-13T02:03:19.112"/>
   </p1510:revLst>
 </p1510:revInfo>
 </file>
 
 <file path=ppt/changesInfos/changesInfo1.xml><?xml version="1.0" encoding="utf-8"?>
 <pc:chgInfo xmlns:a="http://schemas.openxmlformats.org/drawingml/2006/main" xmlns:r="http://schemas.openxmlformats.org/officeDocument/2006/relationships" xmlns:ac="http://schemas.microsoft.com/office/drawing/2013/main/command" xmlns:pc="http://schemas.microsoft.com/office/powerpoint/2013/main/command">
+  <pc:docChgLst>
+    <pc:chgData name="Grant Savage" userId="ea2a00c7-0c11-42df-aec0-080d491ba5cb" providerId="ADAL" clId="{1586950C-A568-9540-9DEE-7E3D61C6DAEC}"/>
+    <pc:docChg chg="modSld">
+      <pc:chgData name="Grant Savage" userId="ea2a00c7-0c11-42df-aec0-080d491ba5cb" providerId="ADAL" clId="{1586950C-A568-9540-9DEE-7E3D61C6DAEC}" dt="2021-12-13T02:03:19.112" v="0" actId="5736"/>
+      <pc:docMkLst>
+        <pc:docMk/>
+      </pc:docMkLst>
+      <pc:sldChg chg="modSp">
+        <pc:chgData name="Grant Savage" userId="ea2a00c7-0c11-42df-aec0-080d491ba5cb" providerId="ADAL" clId="{1586950C-A568-9540-9DEE-7E3D61C6DAEC}" dt="2021-12-13T02:03:19.112" v="0" actId="5736"/>
+        <pc:sldMkLst>
+          <pc:docMk/>
+          <pc:sldMk cId="1943792958" sldId="263"/>
+        </pc:sldMkLst>
+        <pc:graphicFrameChg chg="mod">
+          <ac:chgData name="Grant Savage" userId="ea2a00c7-0c11-42df-aec0-080d491ba5cb" providerId="ADAL" clId="{1586950C-A568-9540-9DEE-7E3D61C6DAEC}" dt="2021-12-13T02:03:19.112" v="0" actId="5736"/>
+          <ac:graphicFrameMkLst>
+            <pc:docMk/>
+            <pc:sldMk cId="1943792958" sldId="263"/>
+            <ac:graphicFrameMk id="6" creationId="{0FA2B7F9-4528-46B6-B085-3340C1669BD0}"/>
+          </ac:graphicFrameMkLst>
+        </pc:graphicFrameChg>
+      </pc:sldChg>
+    </pc:docChg>
+  </pc:docChgLst>
   <pc:docChgLst>
     <pc:chgData name="Grant Savage" userId="ea2a00c7-0c11-42df-aec0-080d491ba5cb" providerId="ADAL" clId="{A5F2D892-D0FB-4B28-ACDD-81D8B73393DF}"/>
     <pc:docChg chg="custSel delSld modSld">
@@ -3413,7 +3437,7 @@
           <a:p>
             <a:fld id="{15F7C7F1-F004-4E77-BB99-7FE000EB8CD6}" type="datetimeFigureOut">
               <a:rPr lang="en-US" smtClean="0"/>
-              <a:t>12/7/2021</a:t>
+              <a:t>12/12/21</a:t>
             </a:fld>
             <a:endParaRPr lang="en-US"/>
           </a:p>
@@ -3583,7 +3607,7 @@
           <a:p>
             <a:fld id="{15F7C7F1-F004-4E77-BB99-7FE000EB8CD6}" type="datetimeFigureOut">
               <a:rPr lang="en-US" smtClean="0"/>
-              <a:t>12/7/2021</a:t>
+              <a:t>12/12/21</a:t>
             </a:fld>
             <a:endParaRPr lang="en-US"/>
           </a:p>
@@ -3763,7 +3787,7 @@
           <a:p>
             <a:fld id="{15F7C7F1-F004-4E77-BB99-7FE000EB8CD6}" type="datetimeFigureOut">
               <a:rPr lang="en-US" smtClean="0"/>
-              <a:t>12/7/2021</a:t>
+              <a:t>12/12/21</a:t>
             </a:fld>
             <a:endParaRPr lang="en-US"/>
           </a:p>
@@ -3933,7 +3957,7 @@
           <a:p>
             <a:fld id="{15F7C7F1-F004-4E77-BB99-7FE000EB8CD6}" type="datetimeFigureOut">
               <a:rPr lang="en-US" smtClean="0"/>
-              <a:t>12/7/2021</a:t>
+              <a:t>12/12/21</a:t>
             </a:fld>
             <a:endParaRPr lang="en-US"/>
           </a:p>
@@ -4179,7 +4203,7 @@
           <a:p>
             <a:fld id="{15F7C7F1-F004-4E77-BB99-7FE000EB8CD6}" type="datetimeFigureOut">
               <a:rPr lang="en-US" smtClean="0"/>
-              <a:t>12/7/2021</a:t>
+              <a:t>12/12/21</a:t>
             </a:fld>
             <a:endParaRPr lang="en-US"/>
           </a:p>
@@ -4411,7 +4435,7 @@
           <a:p>
             <a:fld id="{15F7C7F1-F004-4E77-BB99-7FE000EB8CD6}" type="datetimeFigureOut">
               <a:rPr lang="en-US" smtClean="0"/>
-              <a:t>12/7/2021</a:t>
+              <a:t>12/12/21</a:t>
             </a:fld>
             <a:endParaRPr lang="en-US"/>
           </a:p>
@@ -4778,7 +4802,7 @@
           <a:p>
             <a:fld id="{15F7C7F1-F004-4E77-BB99-7FE000EB8CD6}" type="datetimeFigureOut">
               <a:rPr lang="en-US" smtClean="0"/>
-              <a:t>12/7/2021</a:t>
+              <a:t>12/12/21</a:t>
             </a:fld>
             <a:endParaRPr lang="en-US"/>
           </a:p>
@@ -4896,7 +4920,7 @@
           <a:p>
             <a:fld id="{15F7C7F1-F004-4E77-BB99-7FE000EB8CD6}" type="datetimeFigureOut">
               <a:rPr lang="en-US" smtClean="0"/>
-              <a:t>12/7/2021</a:t>
+              <a:t>12/12/21</a:t>
             </a:fld>
             <a:endParaRPr lang="en-US"/>
           </a:p>
@@ -4991,7 +5015,7 @@
           <a:p>
             <a:fld id="{15F7C7F1-F004-4E77-BB99-7FE000EB8CD6}" type="datetimeFigureOut">
               <a:rPr lang="en-US" smtClean="0"/>
-              <a:t>12/7/2021</a:t>
+              <a:t>12/12/21</a:t>
             </a:fld>
             <a:endParaRPr lang="en-US"/>
           </a:p>
@@ -5268,7 +5292,7 @@
           <a:p>
             <a:fld id="{15F7C7F1-F004-4E77-BB99-7FE000EB8CD6}" type="datetimeFigureOut">
               <a:rPr lang="en-US" smtClean="0"/>
-              <a:t>12/7/2021</a:t>
+              <a:t>12/12/21</a:t>
             </a:fld>
             <a:endParaRPr lang="en-US"/>
           </a:p>
@@ -5525,7 +5549,7 @@
           <a:p>
             <a:fld id="{15F7C7F1-F004-4E77-BB99-7FE000EB8CD6}" type="datetimeFigureOut">
               <a:rPr lang="en-US" smtClean="0"/>
-              <a:t>12/7/2021</a:t>
+              <a:t>12/12/21</a:t>
             </a:fld>
             <a:endParaRPr lang="en-US"/>
           </a:p>
@@ -5738,7 +5762,7 @@
           <a:p>
             <a:fld id="{15F7C7F1-F004-4E77-BB99-7FE000EB8CD6}" type="datetimeFigureOut">
               <a:rPr lang="en-US" smtClean="0"/>
-              <a:t>12/7/2021</a:t>
+              <a:t>12/12/21</a:t>
             </a:fld>
             <a:endParaRPr lang="en-US"/>
           </a:p>
@@ -25396,7 +25420,7 @@
             <p:ph idx="1"/>
             <p:extLst>
               <p:ext uri="{D42A27DB-BD31-4B8C-83A1-F6EECF244321}">
-                <p14:modId xmlns:p14="http://schemas.microsoft.com/office/powerpoint/2010/main" val="3079793308"/>
+                <p14:modId xmlns:p14="http://schemas.microsoft.com/office/powerpoint/2010/main" val="1163702992"/>
               </p:ext>
             </p:extLst>
           </p:nvPr>

</xml_diff>